<commit_message>
Aggiunta la matricola di Morè
</commit_message>
<xml_diff>
--- a/Materiale/TOP-TED.pptx
+++ b/Materiale/TOP-TED.pptx
@@ -109,6 +109,11 @@
       </a:defRPr>
     </a:lvl9pPr>
   </p:defaultTextStyle>
+  <p:extLst>
+    <p:ext uri="{EFAFB233-063F-42B5-8137-9DF3F51BA10A}">
+      <p15:sldGuideLst xmlns:p15="http://schemas.microsoft.com/office/powerpoint/2012/main"/>
+    </p:ext>
+  </p:extLst>
 </p:presentation>
 </file>
 
@@ -350,7 +355,7 @@
           <a:p>
             <a:fld id="{ED291B17-9318-49DB-B28B-6E5994AE9581}" type="datetime1">
               <a:rPr lang="en-US" smtClean="0"/>
-              <a:t>5/10/2021</a:t>
+              <a:t>5/18/2021</a:t>
             </a:fld>
             <a:endParaRPr lang="en-US" dirty="0"/>
           </a:p>
@@ -553,7 +558,7 @@
           <a:p>
             <a:fld id="{2CED4963-E985-44C4-B8C4-FDD613B7C2F8}" type="datetime1">
               <a:rPr lang="en-US" smtClean="0"/>
-              <a:t>5/10/2021</a:t>
+              <a:t>5/18/2021</a:t>
             </a:fld>
             <a:endParaRPr lang="en-US" dirty="0"/>
           </a:p>
@@ -915,7 +920,7 @@
           <a:p>
             <a:fld id="{ED291B17-9318-49DB-B28B-6E5994AE9581}" type="datetime1">
               <a:rPr lang="en-US" smtClean="0"/>
-              <a:t>5/10/2021</a:t>
+              <a:t>5/18/2021</a:t>
             </a:fld>
             <a:endParaRPr lang="en-US" dirty="0"/>
           </a:p>
@@ -1113,7 +1118,7 @@
           <a:p>
             <a:fld id="{78DD82B9-B8EE-4375-B6FF-88FA6ABB15D9}" type="datetime1">
               <a:rPr lang="en-US" smtClean="0"/>
-              <a:t>5/10/2021</a:t>
+              <a:t>5/18/2021</a:t>
             </a:fld>
             <a:endParaRPr lang="en-US" dirty="0"/>
           </a:p>
@@ -1425,7 +1430,7 @@
           <a:p>
             <a:fld id="{B2497495-0637-405E-AE64-5CC7506D51F5}" type="datetime1">
               <a:rPr lang="en-US" smtClean="0"/>
-              <a:t>5/10/2021</a:t>
+              <a:t>5/18/2021</a:t>
             </a:fld>
             <a:endParaRPr lang="en-US" dirty="0"/>
           </a:p>
@@ -1678,7 +1683,7 @@
           <a:p>
             <a:fld id="{7BFFD690-9426-415D-8B65-26881E07B2D4}" type="datetime1">
               <a:rPr lang="en-US" smtClean="0"/>
-              <a:t>5/10/2021</a:t>
+              <a:t>5/18/2021</a:t>
             </a:fld>
             <a:endParaRPr lang="en-US" dirty="0"/>
           </a:p>
@@ -2100,7 +2105,7 @@
           <a:p>
             <a:fld id="{04C4989A-474C-40DE-95B9-011C28B71673}" type="datetime1">
               <a:rPr lang="en-US" smtClean="0"/>
-              <a:t>5/10/2021</a:t>
+              <a:t>5/18/2021</a:t>
             </a:fld>
             <a:endParaRPr lang="en-US" dirty="0"/>
           </a:p>
@@ -2223,7 +2228,7 @@
           <a:p>
             <a:fld id="{5DB4ED54-5B5E-4A04-93D3-5772E3CE3818}" type="datetime1">
               <a:rPr lang="en-US" smtClean="0"/>
-              <a:t>5/10/2021</a:t>
+              <a:t>5/18/2021</a:t>
             </a:fld>
             <a:endParaRPr lang="en-US" dirty="0"/>
           </a:p>
@@ -2318,7 +2323,7 @@
           <a:p>
             <a:fld id="{4EDE50D6-574B-40AF-946F-D52A04ADE379}" type="datetime1">
               <a:rPr lang="en-US" smtClean="0"/>
-              <a:t>5/10/2021</a:t>
+              <a:t>5/18/2021</a:t>
             </a:fld>
             <a:endParaRPr lang="en-US" dirty="0"/>
           </a:p>
@@ -2695,7 +2700,7 @@
           <a:p>
             <a:fld id="{D82884F1-FFEA-405F-9602-3DCA865EDA4E}" type="datetime1">
               <a:rPr lang="en-US" smtClean="0"/>
-              <a:t>5/10/2021</a:t>
+              <a:t>5/18/2021</a:t>
             </a:fld>
             <a:endParaRPr lang="en-US" dirty="0"/>
           </a:p>
@@ -2988,7 +2993,7 @@
           <a:p>
             <a:fld id="{7E18DB4A-8810-4A10-AD5C-D5E2C667F5B3}" type="datetime1">
               <a:rPr lang="en-US" smtClean="0"/>
-              <a:t>5/10/2021</a:t>
+              <a:t>5/18/2021</a:t>
             </a:fld>
             <a:endParaRPr lang="en-US" dirty="0"/>
           </a:p>
@@ -3203,7 +3208,7 @@
           <a:p>
             <a:fld id="{ED291B17-9318-49DB-B28B-6E5994AE9581}" type="datetime1">
               <a:rPr lang="en-US" smtClean="0"/>
-              <a:t>5/10/2021</a:t>
+              <a:t>5/18/2021</a:t>
             </a:fld>
             <a:endParaRPr lang="en-US" dirty="0"/>
           </a:p>
@@ -4125,7 +4130,7 @@
         </p:spPr>
         <p:txBody>
           <a:bodyPr>
-            <a:normAutofit fontScale="62500" lnSpcReduction="20000"/>
+            <a:normAutofit fontScale="40000" lnSpcReduction="20000"/>
           </a:bodyPr>
           <a:lstStyle/>
           <a:p>
@@ -4163,6 +4168,35 @@
               </a:rPr>
               <a:t>Cassina andrea (1057831)</a:t>
             </a:r>
+          </a:p>
+          <a:p>
+            <a:r>
+              <a:rPr lang="it-IT" dirty="0">
+                <a:solidFill>
+                  <a:srgbClr val="FFFFFF">
+                    <a:alpha val="75000"/>
+                  </a:srgbClr>
+                </a:solidFill>
+              </a:rPr>
+              <a:t>MORÉ Gabriele </a:t>
+            </a:r>
+            <a:r>
+              <a:rPr lang="it-IT">
+                <a:solidFill>
+                  <a:srgbClr val="FFFFFF">
+                    <a:alpha val="75000"/>
+                  </a:srgbClr>
+                </a:solidFill>
+              </a:rPr>
+              <a:t>(1058401)</a:t>
+            </a:r>
+            <a:endParaRPr lang="it-IT" dirty="0">
+              <a:solidFill>
+                <a:srgbClr val="FFFFFF">
+                  <a:alpha val="75000"/>
+                </a:srgbClr>
+              </a:solidFill>
+            </a:endParaRPr>
           </a:p>
         </p:txBody>
       </p:sp>

</xml_diff>